<commit_message>
update ppt with ceph
</commit_message>
<xml_diff>
--- a/data structure for DHT project.pptx
+++ b/data structure for DHT project.pptx
@@ -4,10 +4,14 @@
   <p:sldMasterIdLst>
     <p:sldMasterId id="2147483648" r:id="rId1"/>
   </p:sldMasterIdLst>
+  <p:notesMasterIdLst>
+    <p:notesMasterId r:id="rId6"/>
+  </p:notesMasterIdLst>
   <p:sldIdLst>
     <p:sldId id="257" r:id="rId2"/>
     <p:sldId id="258" r:id="rId3"/>
     <p:sldId id="256" r:id="rId4"/>
+    <p:sldId id="261" r:id="rId5"/>
   </p:sldIdLst>
   <p:sldSz cx="12192000" cy="6858000"/>
   <p:notesSz cx="6858000" cy="9144000"/>
@@ -106,7 +110,515 @@
       </a:defRPr>
     </a:lvl9pPr>
   </p:defaultTextStyle>
+  <p:extLst>
+    <p:ext uri="{EFAFB233-063F-42B5-8137-9DF3F51BA10A}">
+      <p15:sldGuideLst xmlns:p15="http://schemas.microsoft.com/office/powerpoint/2012/main"/>
+    </p:ext>
+  </p:extLst>
 </p:presentation>
+</file>
+
+<file path=ppt/notesMasters/notesMaster1.xml><?xml version="1.0" encoding="utf-8"?>
+<p:notesMaster xmlns:a="http://schemas.openxmlformats.org/drawingml/2006/main" xmlns:r="http://schemas.openxmlformats.org/officeDocument/2006/relationships" xmlns:p="http://schemas.openxmlformats.org/presentationml/2006/main">
+  <p:cSld>
+    <p:bg>
+      <p:bgRef idx="1001">
+        <a:schemeClr val="bg1"/>
+      </p:bgRef>
+    </p:bg>
+    <p:spTree>
+      <p:nvGrpSpPr>
+        <p:cNvPr id="1" name=""/>
+        <p:cNvGrpSpPr/>
+        <p:nvPr/>
+      </p:nvGrpSpPr>
+      <p:grpSpPr>
+        <a:xfrm>
+          <a:off x="0" y="0"/>
+          <a:ext cx="0" cy="0"/>
+          <a:chOff x="0" y="0"/>
+          <a:chExt cx="0" cy="0"/>
+        </a:xfrm>
+      </p:grpSpPr>
+      <p:sp>
+        <p:nvSpPr>
+          <p:cNvPr id="2" name="Header Placeholder 1"/>
+          <p:cNvSpPr>
+            <a:spLocks noGrp="1"/>
+          </p:cNvSpPr>
+          <p:nvPr>
+            <p:ph type="hdr" sz="quarter"/>
+          </p:nvPr>
+        </p:nvSpPr>
+        <p:spPr>
+          <a:xfrm>
+            <a:off x="0" y="0"/>
+            <a:ext cx="2971800" cy="458788"/>
+          </a:xfrm>
+          <a:prstGeom prst="rect">
+            <a:avLst/>
+          </a:prstGeom>
+        </p:spPr>
+        <p:txBody>
+          <a:bodyPr vert="horz" lIns="91440" tIns="45720" rIns="91440" bIns="45720" rtlCol="0"/>
+          <a:lstStyle>
+            <a:lvl1pPr algn="l">
+              <a:defRPr sz="1200"/>
+            </a:lvl1pPr>
+          </a:lstStyle>
+          <a:p>
+            <a:endParaRPr lang="en-US"/>
+          </a:p>
+        </p:txBody>
+      </p:sp>
+      <p:sp>
+        <p:nvSpPr>
+          <p:cNvPr id="3" name="Date Placeholder 2"/>
+          <p:cNvSpPr>
+            <a:spLocks noGrp="1"/>
+          </p:cNvSpPr>
+          <p:nvPr>
+            <p:ph type="dt" idx="1"/>
+          </p:nvPr>
+        </p:nvSpPr>
+        <p:spPr>
+          <a:xfrm>
+            <a:off x="3884613" y="0"/>
+            <a:ext cx="2971800" cy="458788"/>
+          </a:xfrm>
+          <a:prstGeom prst="rect">
+            <a:avLst/>
+          </a:prstGeom>
+        </p:spPr>
+        <p:txBody>
+          <a:bodyPr vert="horz" lIns="91440" tIns="45720" rIns="91440" bIns="45720" rtlCol="0"/>
+          <a:lstStyle>
+            <a:lvl1pPr algn="r">
+              <a:defRPr sz="1200"/>
+            </a:lvl1pPr>
+          </a:lstStyle>
+          <a:p>
+            <a:fld id="{E4FBB23A-9ADC-41D0-89AA-755712FD5C90}" type="datetimeFigureOut">
+              <a:rPr lang="en-US" smtClean="0"/>
+              <a:t>10/1/2021</a:t>
+            </a:fld>
+            <a:endParaRPr lang="en-US"/>
+          </a:p>
+        </p:txBody>
+      </p:sp>
+      <p:sp>
+        <p:nvSpPr>
+          <p:cNvPr id="4" name="Slide Image Placeholder 3"/>
+          <p:cNvSpPr>
+            <a:spLocks noGrp="1" noRot="1" noChangeAspect="1"/>
+          </p:cNvSpPr>
+          <p:nvPr>
+            <p:ph type="sldImg" idx="2"/>
+          </p:nvPr>
+        </p:nvSpPr>
+        <p:spPr>
+          <a:xfrm>
+            <a:off x="685800" y="1143000"/>
+            <a:ext cx="5486400" cy="3086100"/>
+          </a:xfrm>
+          <a:prstGeom prst="rect">
+            <a:avLst/>
+          </a:prstGeom>
+          <a:noFill/>
+          <a:ln w="12700">
+            <a:solidFill>
+              <a:prstClr val="black"/>
+            </a:solidFill>
+          </a:ln>
+        </p:spPr>
+        <p:txBody>
+          <a:bodyPr vert="horz" lIns="91440" tIns="45720" rIns="91440" bIns="45720" rtlCol="0" anchor="ctr"/>
+          <a:lstStyle/>
+          <a:p>
+            <a:endParaRPr lang="en-US"/>
+          </a:p>
+        </p:txBody>
+      </p:sp>
+      <p:sp>
+        <p:nvSpPr>
+          <p:cNvPr id="5" name="Notes Placeholder 4"/>
+          <p:cNvSpPr>
+            <a:spLocks noGrp="1"/>
+          </p:cNvSpPr>
+          <p:nvPr>
+            <p:ph type="body" sz="quarter" idx="3"/>
+          </p:nvPr>
+        </p:nvSpPr>
+        <p:spPr>
+          <a:xfrm>
+            <a:off x="685800" y="4400550"/>
+            <a:ext cx="5486400" cy="3600450"/>
+          </a:xfrm>
+          <a:prstGeom prst="rect">
+            <a:avLst/>
+          </a:prstGeom>
+        </p:spPr>
+        <p:txBody>
+          <a:bodyPr vert="horz" lIns="91440" tIns="45720" rIns="91440" bIns="45720" rtlCol="0"/>
+          <a:lstStyle/>
+          <a:p>
+            <a:pPr lvl="0"/>
+            <a:r>
+              <a:rPr lang="en-US"/>
+              <a:t>Click to edit Master text styles</a:t>
+            </a:r>
+          </a:p>
+          <a:p>
+            <a:pPr lvl="1"/>
+            <a:r>
+              <a:rPr lang="en-US"/>
+              <a:t>Second level</a:t>
+            </a:r>
+          </a:p>
+          <a:p>
+            <a:pPr lvl="2"/>
+            <a:r>
+              <a:rPr lang="en-US"/>
+              <a:t>Third level</a:t>
+            </a:r>
+          </a:p>
+          <a:p>
+            <a:pPr lvl="3"/>
+            <a:r>
+              <a:rPr lang="en-US"/>
+              <a:t>Fourth level</a:t>
+            </a:r>
+          </a:p>
+          <a:p>
+            <a:pPr lvl="4"/>
+            <a:r>
+              <a:rPr lang="en-US"/>
+              <a:t>Fifth level</a:t>
+            </a:r>
+          </a:p>
+        </p:txBody>
+      </p:sp>
+      <p:sp>
+        <p:nvSpPr>
+          <p:cNvPr id="6" name="Footer Placeholder 5"/>
+          <p:cNvSpPr>
+            <a:spLocks noGrp="1"/>
+          </p:cNvSpPr>
+          <p:nvPr>
+            <p:ph type="ftr" sz="quarter" idx="4"/>
+          </p:nvPr>
+        </p:nvSpPr>
+        <p:spPr>
+          <a:xfrm>
+            <a:off x="0" y="8685213"/>
+            <a:ext cx="2971800" cy="458787"/>
+          </a:xfrm>
+          <a:prstGeom prst="rect">
+            <a:avLst/>
+          </a:prstGeom>
+        </p:spPr>
+        <p:txBody>
+          <a:bodyPr vert="horz" lIns="91440" tIns="45720" rIns="91440" bIns="45720" rtlCol="0" anchor="b"/>
+          <a:lstStyle>
+            <a:lvl1pPr algn="l">
+              <a:defRPr sz="1200"/>
+            </a:lvl1pPr>
+          </a:lstStyle>
+          <a:p>
+            <a:endParaRPr lang="en-US"/>
+          </a:p>
+        </p:txBody>
+      </p:sp>
+      <p:sp>
+        <p:nvSpPr>
+          <p:cNvPr id="7" name="Slide Number Placeholder 6"/>
+          <p:cNvSpPr>
+            <a:spLocks noGrp="1"/>
+          </p:cNvSpPr>
+          <p:nvPr>
+            <p:ph type="sldNum" sz="quarter" idx="5"/>
+          </p:nvPr>
+        </p:nvSpPr>
+        <p:spPr>
+          <a:xfrm>
+            <a:off x="3884613" y="8685213"/>
+            <a:ext cx="2971800" cy="458787"/>
+          </a:xfrm>
+          <a:prstGeom prst="rect">
+            <a:avLst/>
+          </a:prstGeom>
+        </p:spPr>
+        <p:txBody>
+          <a:bodyPr vert="horz" lIns="91440" tIns="45720" rIns="91440" bIns="45720" rtlCol="0" anchor="b"/>
+          <a:lstStyle>
+            <a:lvl1pPr algn="r">
+              <a:defRPr sz="1200"/>
+            </a:lvl1pPr>
+          </a:lstStyle>
+          <a:p>
+            <a:fld id="{EE4A14B6-5D1A-4304-A297-01434E57E490}" type="slidenum">
+              <a:rPr lang="en-US" smtClean="0"/>
+              <a:t>‹#›</a:t>
+            </a:fld>
+            <a:endParaRPr lang="en-US"/>
+          </a:p>
+        </p:txBody>
+      </p:sp>
+    </p:spTree>
+    <p:extLst>
+      <p:ext uri="{BB962C8B-B14F-4D97-AF65-F5344CB8AC3E}">
+        <p14:creationId xmlns:p14="http://schemas.microsoft.com/office/powerpoint/2010/main" val="2074986693"/>
+      </p:ext>
+    </p:extLst>
+  </p:cSld>
+  <p:clrMap bg1="lt1" tx1="dk1" bg2="lt2" tx2="dk2" accent1="accent1" accent2="accent2" accent3="accent3" accent4="accent4" accent5="accent5" accent6="accent6" hlink="hlink" folHlink="folHlink"/>
+  <p:notesStyle>
+    <a:lvl1pPr marL="0" algn="l" defTabSz="914400" rtl="0" eaLnBrk="1" latinLnBrk="0" hangingPunct="1">
+      <a:defRPr sz="1200" kern="1200">
+        <a:solidFill>
+          <a:schemeClr val="tx1"/>
+        </a:solidFill>
+        <a:latin typeface="+mn-lt"/>
+        <a:ea typeface="+mn-ea"/>
+        <a:cs typeface="+mn-cs"/>
+      </a:defRPr>
+    </a:lvl1pPr>
+    <a:lvl2pPr marL="457200" algn="l" defTabSz="914400" rtl="0" eaLnBrk="1" latinLnBrk="0" hangingPunct="1">
+      <a:defRPr sz="1200" kern="1200">
+        <a:solidFill>
+          <a:schemeClr val="tx1"/>
+        </a:solidFill>
+        <a:latin typeface="+mn-lt"/>
+        <a:ea typeface="+mn-ea"/>
+        <a:cs typeface="+mn-cs"/>
+      </a:defRPr>
+    </a:lvl2pPr>
+    <a:lvl3pPr marL="914400" algn="l" defTabSz="914400" rtl="0" eaLnBrk="1" latinLnBrk="0" hangingPunct="1">
+      <a:defRPr sz="1200" kern="1200">
+        <a:solidFill>
+          <a:schemeClr val="tx1"/>
+        </a:solidFill>
+        <a:latin typeface="+mn-lt"/>
+        <a:ea typeface="+mn-ea"/>
+        <a:cs typeface="+mn-cs"/>
+      </a:defRPr>
+    </a:lvl3pPr>
+    <a:lvl4pPr marL="1371600" algn="l" defTabSz="914400" rtl="0" eaLnBrk="1" latinLnBrk="0" hangingPunct="1">
+      <a:defRPr sz="1200" kern="1200">
+        <a:solidFill>
+          <a:schemeClr val="tx1"/>
+        </a:solidFill>
+        <a:latin typeface="+mn-lt"/>
+        <a:ea typeface="+mn-ea"/>
+        <a:cs typeface="+mn-cs"/>
+      </a:defRPr>
+    </a:lvl4pPr>
+    <a:lvl5pPr marL="1828800" algn="l" defTabSz="914400" rtl="0" eaLnBrk="1" latinLnBrk="0" hangingPunct="1">
+      <a:defRPr sz="1200" kern="1200">
+        <a:solidFill>
+          <a:schemeClr val="tx1"/>
+        </a:solidFill>
+        <a:latin typeface="+mn-lt"/>
+        <a:ea typeface="+mn-ea"/>
+        <a:cs typeface="+mn-cs"/>
+      </a:defRPr>
+    </a:lvl5pPr>
+    <a:lvl6pPr marL="2286000" algn="l" defTabSz="914400" rtl="0" eaLnBrk="1" latinLnBrk="0" hangingPunct="1">
+      <a:defRPr sz="1200" kern="1200">
+        <a:solidFill>
+          <a:schemeClr val="tx1"/>
+        </a:solidFill>
+        <a:latin typeface="+mn-lt"/>
+        <a:ea typeface="+mn-ea"/>
+        <a:cs typeface="+mn-cs"/>
+      </a:defRPr>
+    </a:lvl6pPr>
+    <a:lvl7pPr marL="2743200" algn="l" defTabSz="914400" rtl="0" eaLnBrk="1" latinLnBrk="0" hangingPunct="1">
+      <a:defRPr sz="1200" kern="1200">
+        <a:solidFill>
+          <a:schemeClr val="tx1"/>
+        </a:solidFill>
+        <a:latin typeface="+mn-lt"/>
+        <a:ea typeface="+mn-ea"/>
+        <a:cs typeface="+mn-cs"/>
+      </a:defRPr>
+    </a:lvl7pPr>
+    <a:lvl8pPr marL="3200400" algn="l" defTabSz="914400" rtl="0" eaLnBrk="1" latinLnBrk="0" hangingPunct="1">
+      <a:defRPr sz="1200" kern="1200">
+        <a:solidFill>
+          <a:schemeClr val="tx1"/>
+        </a:solidFill>
+        <a:latin typeface="+mn-lt"/>
+        <a:ea typeface="+mn-ea"/>
+        <a:cs typeface="+mn-cs"/>
+      </a:defRPr>
+    </a:lvl8pPr>
+    <a:lvl9pPr marL="3657600" algn="l" defTabSz="914400" rtl="0" eaLnBrk="1" latinLnBrk="0" hangingPunct="1">
+      <a:defRPr sz="1200" kern="1200">
+        <a:solidFill>
+          <a:schemeClr val="tx1"/>
+        </a:solidFill>
+        <a:latin typeface="+mn-lt"/>
+        <a:ea typeface="+mn-ea"/>
+        <a:cs typeface="+mn-cs"/>
+      </a:defRPr>
+    </a:lvl9pPr>
+  </p:notesStyle>
+</p:notesMaster>
+</file>
+
+<file path=ppt/notesSlides/notesSlide1.xml><?xml version="1.0" encoding="utf-8"?>
+<p:notes xmlns:a="http://schemas.openxmlformats.org/drawingml/2006/main" xmlns:r="http://schemas.openxmlformats.org/officeDocument/2006/relationships" xmlns:p="http://schemas.openxmlformats.org/presentationml/2006/main">
+  <p:cSld>
+    <p:spTree>
+      <p:nvGrpSpPr>
+        <p:cNvPr id="1" name=""/>
+        <p:cNvGrpSpPr/>
+        <p:nvPr/>
+      </p:nvGrpSpPr>
+      <p:grpSpPr>
+        <a:xfrm>
+          <a:off x="0" y="0"/>
+          <a:ext cx="0" cy="0"/>
+          <a:chOff x="0" y="0"/>
+          <a:chExt cx="0" cy="0"/>
+        </a:xfrm>
+      </p:grpSpPr>
+      <p:sp>
+        <p:nvSpPr>
+          <p:cNvPr id="2" name="Slide Image Placeholder 1"/>
+          <p:cNvSpPr>
+            <a:spLocks noGrp="1" noRot="1" noChangeAspect="1"/>
+          </p:cNvSpPr>
+          <p:nvPr>
+            <p:ph type="sldImg"/>
+          </p:nvPr>
+        </p:nvSpPr>
+        <p:spPr/>
+      </p:sp>
+      <p:sp>
+        <p:nvSpPr>
+          <p:cNvPr id="3" name="Notes Placeholder 2"/>
+          <p:cNvSpPr>
+            <a:spLocks noGrp="1"/>
+          </p:cNvSpPr>
+          <p:nvPr>
+            <p:ph type="body" idx="1"/>
+          </p:nvPr>
+        </p:nvSpPr>
+        <p:spPr/>
+        <p:txBody>
+          <a:bodyPr/>
+          <a:lstStyle/>
+          <a:p>
+            <a:r>
+              <a:rPr lang="en-US" dirty="0"/>
+              <a:t>Cluster is represented by a </a:t>
+            </a:r>
+            <a:r>
+              <a:rPr lang="en-US" dirty="0" err="1"/>
+              <a:t>TreeMap</a:t>
+            </a:r>
+            <a:r>
+              <a:rPr lang="en-US" dirty="0"/>
+              <a:t>, which is an ordered map. </a:t>
+            </a:r>
+          </a:p>
+          <a:p>
+            <a:r>
+              <a:rPr lang="en-US" dirty="0" err="1"/>
+              <a:t>Ceph</a:t>
+            </a:r>
+            <a:r>
+              <a:rPr lang="en-US" dirty="0"/>
+              <a:t> nodes represented by </a:t>
+            </a:r>
+            <a:r>
+              <a:rPr lang="en-US" dirty="0" err="1"/>
+              <a:t>CeNode</a:t>
+            </a:r>
+            <a:r>
+              <a:rPr lang="en-US" dirty="0"/>
+              <a:t> Objects and are stored in the </a:t>
+            </a:r>
+            <a:r>
+              <a:rPr lang="en-US" dirty="0" err="1"/>
+              <a:t>TreeMap</a:t>
+            </a:r>
+            <a:r>
+              <a:rPr lang="en-US" dirty="0"/>
+              <a:t>.</a:t>
+            </a:r>
+          </a:p>
+          <a:p>
+            <a:r>
+              <a:rPr lang="en-US" dirty="0" err="1"/>
+              <a:t>CeNode</a:t>
+            </a:r>
+            <a:r>
+              <a:rPr lang="en-US" dirty="0"/>
+              <a:t> Objects contain Map </a:t>
+            </a:r>
+            <a:r>
+              <a:rPr lang="en-US" dirty="0" err="1"/>
+              <a:t>storedData</a:t>
+            </a:r>
+            <a:r>
+              <a:rPr lang="en-US" dirty="0"/>
+              <a:t>, </a:t>
+            </a:r>
+            <a:r>
+              <a:rPr lang="en-US" dirty="0" err="1"/>
+              <a:t>storedData</a:t>
+            </a:r>
+            <a:r>
+              <a:rPr lang="en-US" dirty="0"/>
+              <a:t> holds actual data points.</a:t>
+            </a:r>
+            <a:br>
+              <a:rPr lang="en-US" dirty="0"/>
+            </a:br>
+            <a:endParaRPr lang="en-US" dirty="0"/>
+          </a:p>
+          <a:p>
+            <a:endParaRPr lang="en-US" dirty="0"/>
+          </a:p>
+        </p:txBody>
+      </p:sp>
+      <p:sp>
+        <p:nvSpPr>
+          <p:cNvPr id="4" name="Slide Number Placeholder 3"/>
+          <p:cNvSpPr>
+            <a:spLocks noGrp="1"/>
+          </p:cNvSpPr>
+          <p:nvPr>
+            <p:ph type="sldNum" sz="quarter" idx="5"/>
+          </p:nvPr>
+        </p:nvSpPr>
+        <p:spPr/>
+        <p:txBody>
+          <a:bodyPr/>
+          <a:lstStyle/>
+          <a:p>
+            <a:fld id="{EE4A14B6-5D1A-4304-A297-01434E57E490}" type="slidenum">
+              <a:rPr lang="en-US" smtClean="0"/>
+              <a:t>4</a:t>
+            </a:fld>
+            <a:endParaRPr lang="en-US"/>
+          </a:p>
+        </p:txBody>
+      </p:sp>
+    </p:spTree>
+    <p:extLst>
+      <p:ext uri="{BB962C8B-B14F-4D97-AF65-F5344CB8AC3E}">
+        <p14:creationId xmlns:p14="http://schemas.microsoft.com/office/powerpoint/2010/main" val="1786405490"/>
+      </p:ext>
+    </p:extLst>
+  </p:cSld>
+  <p:clrMapOvr>
+    <a:masterClrMapping/>
+  </p:clrMapOvr>
+</p:notes>
 </file>
 
 <file path=ppt/slideLayouts/slideLayout1.xml><?xml version="1.0" encoding="utf-8"?>
@@ -256,7 +768,7 @@
           <a:p>
             <a:fld id="{54F31808-ABE4-1E40-9639-D01AF1A225CD}" type="datetimeFigureOut">
               <a:rPr lang="en-US" smtClean="0"/>
-              <a:t>9/30/21</a:t>
+              <a:t>10/1/2021</a:t>
             </a:fld>
             <a:endParaRPr lang="en-US"/>
           </a:p>
@@ -454,7 +966,7 @@
           <a:p>
             <a:fld id="{54F31808-ABE4-1E40-9639-D01AF1A225CD}" type="datetimeFigureOut">
               <a:rPr lang="en-US" smtClean="0"/>
-              <a:t>9/30/21</a:t>
+              <a:t>10/1/2021</a:t>
             </a:fld>
             <a:endParaRPr lang="en-US"/>
           </a:p>
@@ -662,7 +1174,7 @@
           <a:p>
             <a:fld id="{54F31808-ABE4-1E40-9639-D01AF1A225CD}" type="datetimeFigureOut">
               <a:rPr lang="en-US" smtClean="0"/>
-              <a:t>9/30/21</a:t>
+              <a:t>10/1/2021</a:t>
             </a:fld>
             <a:endParaRPr lang="en-US"/>
           </a:p>
@@ -860,7 +1372,7 @@
           <a:p>
             <a:fld id="{54F31808-ABE4-1E40-9639-D01AF1A225CD}" type="datetimeFigureOut">
               <a:rPr lang="en-US" smtClean="0"/>
-              <a:t>9/30/21</a:t>
+              <a:t>10/1/2021</a:t>
             </a:fld>
             <a:endParaRPr lang="en-US"/>
           </a:p>
@@ -1135,7 +1647,7 @@
           <a:p>
             <a:fld id="{54F31808-ABE4-1E40-9639-D01AF1A225CD}" type="datetimeFigureOut">
               <a:rPr lang="en-US" smtClean="0"/>
-              <a:t>9/30/21</a:t>
+              <a:t>10/1/2021</a:t>
             </a:fld>
             <a:endParaRPr lang="en-US"/>
           </a:p>
@@ -1400,7 +1912,7 @@
           <a:p>
             <a:fld id="{54F31808-ABE4-1E40-9639-D01AF1A225CD}" type="datetimeFigureOut">
               <a:rPr lang="en-US" smtClean="0"/>
-              <a:t>9/30/21</a:t>
+              <a:t>10/1/2021</a:t>
             </a:fld>
             <a:endParaRPr lang="en-US"/>
           </a:p>
@@ -1812,7 +2324,7 @@
           <a:p>
             <a:fld id="{54F31808-ABE4-1E40-9639-D01AF1A225CD}" type="datetimeFigureOut">
               <a:rPr lang="en-US" smtClean="0"/>
-              <a:t>9/30/21</a:t>
+              <a:t>10/1/2021</a:t>
             </a:fld>
             <a:endParaRPr lang="en-US"/>
           </a:p>
@@ -1953,7 +2465,7 @@
           <a:p>
             <a:fld id="{54F31808-ABE4-1E40-9639-D01AF1A225CD}" type="datetimeFigureOut">
               <a:rPr lang="en-US" smtClean="0"/>
-              <a:t>9/30/21</a:t>
+              <a:t>10/1/2021</a:t>
             </a:fld>
             <a:endParaRPr lang="en-US"/>
           </a:p>
@@ -2066,7 +2578,7 @@
           <a:p>
             <a:fld id="{54F31808-ABE4-1E40-9639-D01AF1A225CD}" type="datetimeFigureOut">
               <a:rPr lang="en-US" smtClean="0"/>
-              <a:t>9/30/21</a:t>
+              <a:t>10/1/2021</a:t>
             </a:fld>
             <a:endParaRPr lang="en-US"/>
           </a:p>
@@ -2377,7 +2889,7 @@
           <a:p>
             <a:fld id="{54F31808-ABE4-1E40-9639-D01AF1A225CD}" type="datetimeFigureOut">
               <a:rPr lang="en-US" smtClean="0"/>
-              <a:t>9/30/21</a:t>
+              <a:t>10/1/2021</a:t>
             </a:fld>
             <a:endParaRPr lang="en-US"/>
           </a:p>
@@ -2665,7 +3177,7 @@
           <a:p>
             <a:fld id="{54F31808-ABE4-1E40-9639-D01AF1A225CD}" type="datetimeFigureOut">
               <a:rPr lang="en-US" smtClean="0"/>
-              <a:t>9/30/21</a:t>
+              <a:t>10/1/2021</a:t>
             </a:fld>
             <a:endParaRPr lang="en-US"/>
           </a:p>
@@ -2906,7 +3418,7 @@
           <a:p>
             <a:fld id="{54F31808-ABE4-1E40-9639-D01AF1A225CD}" type="datetimeFigureOut">
               <a:rPr lang="en-US" smtClean="0"/>
-              <a:t>9/30/21</a:t>
+              <a:t>10/1/2021</a:t>
             </a:fld>
             <a:endParaRPr lang="en-US"/>
           </a:p>
@@ -5146,6 +5658,997 @@
 </p:sld>
 </file>
 
+<file path=ppt/slides/slide4.xml><?xml version="1.0" encoding="utf-8"?>
+<p:sld xmlns:a="http://schemas.openxmlformats.org/drawingml/2006/main" xmlns:r="http://schemas.openxmlformats.org/officeDocument/2006/relationships" xmlns:p="http://schemas.openxmlformats.org/presentationml/2006/main">
+  <p:cSld>
+    <p:spTree>
+      <p:nvGrpSpPr>
+        <p:cNvPr id="1" name=""/>
+        <p:cNvGrpSpPr/>
+        <p:nvPr/>
+      </p:nvGrpSpPr>
+      <p:grpSpPr>
+        <a:xfrm>
+          <a:off x="0" y="0"/>
+          <a:ext cx="0" cy="0"/>
+          <a:chOff x="0" y="0"/>
+          <a:chExt cx="0" cy="0"/>
+        </a:xfrm>
+      </p:grpSpPr>
+      <p:sp>
+        <p:nvSpPr>
+          <p:cNvPr id="13" name="Rectangle 12">
+            <a:extLst>
+              <a:ext uri="{FF2B5EF4-FFF2-40B4-BE49-F238E27FC236}">
+                <a16:creationId xmlns:a16="http://schemas.microsoft.com/office/drawing/2014/main" id="{274982CC-D835-0E43-BD6F-F993F014E2ED}"/>
+              </a:ext>
+            </a:extLst>
+          </p:cNvPr>
+          <p:cNvSpPr/>
+          <p:nvPr/>
+        </p:nvSpPr>
+        <p:spPr>
+          <a:xfrm>
+            <a:off x="7855476" y="2502731"/>
+            <a:ext cx="1628775" cy="387667"/>
+          </a:xfrm>
+          <a:prstGeom prst="rect">
+            <a:avLst/>
+          </a:prstGeom>
+          <a:solidFill>
+            <a:srgbClr val="00B050"/>
+          </a:solidFill>
+        </p:spPr>
+        <p:style>
+          <a:lnRef idx="2">
+            <a:schemeClr val="dk1">
+              <a:shade val="50000"/>
+            </a:schemeClr>
+          </a:lnRef>
+          <a:fillRef idx="1">
+            <a:schemeClr val="dk1"/>
+          </a:fillRef>
+          <a:effectRef idx="0">
+            <a:schemeClr val="dk1"/>
+          </a:effectRef>
+          <a:fontRef idx="minor">
+            <a:schemeClr val="lt1"/>
+          </a:fontRef>
+        </p:style>
+        <p:txBody>
+          <a:bodyPr rtlCol="0" anchor="ctr"/>
+          <a:lstStyle/>
+          <a:p>
+            <a:pPr algn="ctr"/>
+            <a:r>
+              <a:rPr lang="en-US" dirty="0"/>
+              <a:t>name</a:t>
+            </a:r>
+          </a:p>
+        </p:txBody>
+      </p:sp>
+      <p:sp>
+        <p:nvSpPr>
+          <p:cNvPr id="20" name="Title 19">
+            <a:extLst>
+              <a:ext uri="{FF2B5EF4-FFF2-40B4-BE49-F238E27FC236}">
+                <a16:creationId xmlns:a16="http://schemas.microsoft.com/office/drawing/2014/main" id="{C12DCEB1-692F-C846-A3AA-D2FAC869720D}"/>
+              </a:ext>
+            </a:extLst>
+          </p:cNvPr>
+          <p:cNvSpPr>
+            <a:spLocks noGrp="1"/>
+          </p:cNvSpPr>
+          <p:nvPr>
+            <p:ph type="title"/>
+          </p:nvPr>
+        </p:nvSpPr>
+        <p:spPr>
+          <a:xfrm>
+            <a:off x="266850" y="163047"/>
+            <a:ext cx="10515600" cy="1325563"/>
+          </a:xfrm>
+        </p:spPr>
+        <p:txBody>
+          <a:bodyPr/>
+          <a:lstStyle/>
+          <a:p>
+            <a:r>
+              <a:rPr lang="en-US" dirty="0"/>
+              <a:t>Data structure: </a:t>
+            </a:r>
+            <a:r>
+              <a:rPr lang="en-US" dirty="0" err="1"/>
+              <a:t>Ceph</a:t>
+            </a:r>
+            <a:endParaRPr lang="en-US" dirty="0"/>
+          </a:p>
+        </p:txBody>
+      </p:sp>
+      <p:sp>
+        <p:nvSpPr>
+          <p:cNvPr id="8" name="Rectangle 7">
+            <a:extLst>
+              <a:ext uri="{FF2B5EF4-FFF2-40B4-BE49-F238E27FC236}">
+                <a16:creationId xmlns:a16="http://schemas.microsoft.com/office/drawing/2014/main" id="{4BABDB36-A0DC-4B98-A5A7-DE21BAF73A02}"/>
+              </a:ext>
+            </a:extLst>
+          </p:cNvPr>
+          <p:cNvSpPr/>
+          <p:nvPr/>
+        </p:nvSpPr>
+        <p:spPr>
+          <a:xfrm>
+            <a:off x="5793641" y="2338624"/>
+            <a:ext cx="6287085" cy="4160883"/>
+          </a:xfrm>
+          <a:prstGeom prst="rect">
+            <a:avLst/>
+          </a:prstGeom>
+          <a:noFill/>
+          <a:ln w="38100"/>
+        </p:spPr>
+        <p:style>
+          <a:lnRef idx="2">
+            <a:schemeClr val="accent1">
+              <a:shade val="50000"/>
+            </a:schemeClr>
+          </a:lnRef>
+          <a:fillRef idx="1">
+            <a:schemeClr val="accent1"/>
+          </a:fillRef>
+          <a:effectRef idx="0">
+            <a:schemeClr val="accent1"/>
+          </a:effectRef>
+          <a:fontRef idx="minor">
+            <a:schemeClr val="lt1"/>
+          </a:fontRef>
+        </p:style>
+        <p:txBody>
+          <a:bodyPr rtlCol="0" anchor="ctr"/>
+          <a:lstStyle/>
+          <a:p>
+            <a:pPr algn="ctr"/>
+            <a:endParaRPr lang="en-US"/>
+          </a:p>
+        </p:txBody>
+      </p:sp>
+      <p:sp>
+        <p:nvSpPr>
+          <p:cNvPr id="25" name="TextBox 24">
+            <a:extLst>
+              <a:ext uri="{FF2B5EF4-FFF2-40B4-BE49-F238E27FC236}">
+                <a16:creationId xmlns:a16="http://schemas.microsoft.com/office/drawing/2014/main" id="{8916AF4C-FF0D-EE43-B45C-70DB1644D7FA}"/>
+              </a:ext>
+            </a:extLst>
+          </p:cNvPr>
+          <p:cNvSpPr txBox="1"/>
+          <p:nvPr/>
+        </p:nvSpPr>
+        <p:spPr>
+          <a:xfrm>
+            <a:off x="6065206" y="2370556"/>
+            <a:ext cx="1423788" cy="523220"/>
+          </a:xfrm>
+          <a:prstGeom prst="rect">
+            <a:avLst/>
+          </a:prstGeom>
+          <a:noFill/>
+        </p:spPr>
+        <p:txBody>
+          <a:bodyPr wrap="none" rtlCol="0">
+            <a:spAutoFit/>
+          </a:bodyPr>
+          <a:lstStyle/>
+          <a:p>
+            <a:r>
+              <a:rPr lang="en-US" sz="2800" dirty="0"/>
+              <a:t> </a:t>
+            </a:r>
+            <a:r>
+              <a:rPr lang="en-US" sz="2800" dirty="0" err="1"/>
+              <a:t>CeNode</a:t>
+            </a:r>
+            <a:endParaRPr lang="en-US" sz="2800" dirty="0"/>
+          </a:p>
+        </p:txBody>
+      </p:sp>
+      <p:sp>
+        <p:nvSpPr>
+          <p:cNvPr id="2" name="TextBox 1">
+            <a:extLst>
+              <a:ext uri="{FF2B5EF4-FFF2-40B4-BE49-F238E27FC236}">
+                <a16:creationId xmlns:a16="http://schemas.microsoft.com/office/drawing/2014/main" id="{A3EE84E6-CDC7-44EF-8892-AA794C5D3592}"/>
+              </a:ext>
+            </a:extLst>
+          </p:cNvPr>
+          <p:cNvSpPr txBox="1"/>
+          <p:nvPr/>
+        </p:nvSpPr>
+        <p:spPr>
+          <a:xfrm>
+            <a:off x="5721875" y="53677"/>
+            <a:ext cx="5637088" cy="523220"/>
+          </a:xfrm>
+          <a:prstGeom prst="rect">
+            <a:avLst/>
+          </a:prstGeom>
+          <a:noFill/>
+        </p:spPr>
+        <p:txBody>
+          <a:bodyPr wrap="square" rtlCol="0">
+            <a:spAutoFit/>
+          </a:bodyPr>
+          <a:lstStyle/>
+          <a:p>
+            <a:r>
+              <a:rPr lang="en-US" sz="2800" dirty="0" err="1"/>
+              <a:t>TreeMap</a:t>
+            </a:r>
+            <a:r>
+              <a:rPr lang="en-US" sz="2800" dirty="0"/>
+              <a:t>&lt;String, </a:t>
+            </a:r>
+            <a:r>
+              <a:rPr lang="en-US" sz="2800" dirty="0" err="1"/>
+              <a:t>CeNode</a:t>
+            </a:r>
+            <a:r>
+              <a:rPr lang="en-US" sz="2800" dirty="0"/>
+              <a:t>&gt;</a:t>
+            </a:r>
+          </a:p>
+        </p:txBody>
+      </p:sp>
+      <p:graphicFrame>
+        <p:nvGraphicFramePr>
+          <p:cNvPr id="19" name="Table 11">
+            <a:extLst>
+              <a:ext uri="{FF2B5EF4-FFF2-40B4-BE49-F238E27FC236}">
+                <a16:creationId xmlns:a16="http://schemas.microsoft.com/office/drawing/2014/main" id="{5EB9B82B-22B1-4ED2-8343-EC9E74D5922F}"/>
+              </a:ext>
+            </a:extLst>
+          </p:cNvPr>
+          <p:cNvGraphicFramePr>
+            <a:graphicFrameLocks noGrp="1"/>
+          </p:cNvGraphicFramePr>
+          <p:nvPr>
+            <p:extLst>
+              <p:ext uri="{D42A27DB-BD31-4B8C-83A1-F6EECF244321}">
+                <p14:modId xmlns:p14="http://schemas.microsoft.com/office/powerpoint/2010/main" val="1862917950"/>
+              </p:ext>
+            </p:extLst>
+          </p:nvPr>
+        </p:nvGraphicFramePr>
+        <p:xfrm>
+          <a:off x="5793642" y="576897"/>
+          <a:ext cx="4342124" cy="1448655"/>
+        </p:xfrm>
+        <a:graphic>
+          <a:graphicData uri="http://schemas.openxmlformats.org/drawingml/2006/table">
+            <a:tbl>
+              <a:tblPr firstRow="1" bandRow="1">
+                <a:tableStyleId>{5C22544A-7EE6-4342-B048-85BDC9FD1C3A}</a:tableStyleId>
+              </a:tblPr>
+              <a:tblGrid>
+                <a:gridCol w="2175193">
+                  <a:extLst>
+                    <a:ext uri="{9D8B030D-6E8A-4147-A177-3AD203B41FA5}">
+                      <a16:colId xmlns:a16="http://schemas.microsoft.com/office/drawing/2014/main" val="577567024"/>
+                    </a:ext>
+                  </a:extLst>
+                </a:gridCol>
+                <a:gridCol w="2166931">
+                  <a:extLst>
+                    <a:ext uri="{9D8B030D-6E8A-4147-A177-3AD203B41FA5}">
+                      <a16:colId xmlns:a16="http://schemas.microsoft.com/office/drawing/2014/main" val="1065119181"/>
+                    </a:ext>
+                  </a:extLst>
+                </a:gridCol>
+              </a:tblGrid>
+              <a:tr h="413099">
+                <a:tc>
+                  <a:txBody>
+                    <a:bodyPr/>
+                    <a:lstStyle/>
+                    <a:p>
+                      <a:r>
+                        <a:rPr lang="en-US" dirty="0"/>
+                        <a:t>Key (String)</a:t>
+                      </a:r>
+                    </a:p>
+                  </a:txBody>
+                  <a:tcPr/>
+                </a:tc>
+                <a:tc>
+                  <a:txBody>
+                    <a:bodyPr/>
+                    <a:lstStyle/>
+                    <a:p>
+                      <a:r>
+                        <a:rPr lang="en-US" dirty="0"/>
+                        <a:t>Value (</a:t>
+                      </a:r>
+                      <a:r>
+                        <a:rPr lang="en-US" dirty="0" err="1"/>
+                        <a:t>CeNode</a:t>
+                      </a:r>
+                      <a:r>
+                        <a:rPr lang="en-US" dirty="0"/>
+                        <a:t> Obj)</a:t>
+                      </a:r>
+                    </a:p>
+                  </a:txBody>
+                  <a:tcPr/>
+                </a:tc>
+                <a:extLst>
+                  <a:ext uri="{0D108BD9-81ED-4DB2-BD59-A6C34878D82A}">
+                    <a16:rowId xmlns:a16="http://schemas.microsoft.com/office/drawing/2014/main" val="1973540374"/>
+                  </a:ext>
+                </a:extLst>
+              </a:tr>
+              <a:tr h="517778">
+                <a:tc>
+                  <a:txBody>
+                    <a:bodyPr/>
+                    <a:lstStyle/>
+                    <a:p>
+                      <a:r>
+                        <a:rPr lang="en-US" sz="1800" kern="1200" dirty="0">
+                          <a:solidFill>
+                            <a:schemeClr val="dk1"/>
+                          </a:solidFill>
+                          <a:effectLst/>
+                          <a:latin typeface="+mn-lt"/>
+                          <a:ea typeface="+mn-ea"/>
+                          <a:cs typeface="+mn-cs"/>
+                        </a:rPr>
+                        <a:t>“Ce_Node-01” String</a:t>
+                      </a:r>
+                      <a:endParaRPr lang="en-US" dirty="0"/>
+                    </a:p>
+                  </a:txBody>
+                  <a:tcPr/>
+                </a:tc>
+                <a:tc>
+                  <a:txBody>
+                    <a:bodyPr/>
+                    <a:lstStyle/>
+                    <a:p>
+                      <a:r>
+                        <a:rPr lang="en-US" dirty="0"/>
+                        <a:t>CeNode1 Object</a:t>
+                      </a:r>
+                    </a:p>
+                  </a:txBody>
+                  <a:tcPr/>
+                </a:tc>
+                <a:extLst>
+                  <a:ext uri="{0D108BD9-81ED-4DB2-BD59-A6C34878D82A}">
+                    <a16:rowId xmlns:a16="http://schemas.microsoft.com/office/drawing/2014/main" val="83294924"/>
+                  </a:ext>
+                </a:extLst>
+              </a:tr>
+              <a:tr h="517778">
+                <a:tc>
+                  <a:txBody>
+                    <a:bodyPr/>
+                    <a:lstStyle/>
+                    <a:p>
+                      <a:r>
+                        <a:rPr lang="en-US" dirty="0"/>
+                        <a:t>…</a:t>
+                      </a:r>
+                    </a:p>
+                  </a:txBody>
+                  <a:tcPr/>
+                </a:tc>
+                <a:tc>
+                  <a:txBody>
+                    <a:bodyPr/>
+                    <a:lstStyle/>
+                    <a:p>
+                      <a:r>
+                        <a:rPr lang="en-US" dirty="0"/>
+                        <a:t>…</a:t>
+                      </a:r>
+                    </a:p>
+                  </a:txBody>
+                  <a:tcPr/>
+                </a:tc>
+                <a:extLst>
+                  <a:ext uri="{0D108BD9-81ED-4DB2-BD59-A6C34878D82A}">
+                    <a16:rowId xmlns:a16="http://schemas.microsoft.com/office/drawing/2014/main" val="2428146266"/>
+                  </a:ext>
+                </a:extLst>
+              </a:tr>
+            </a:tbl>
+          </a:graphicData>
+        </a:graphic>
+      </p:graphicFrame>
+      <p:sp>
+        <p:nvSpPr>
+          <p:cNvPr id="22" name="Rectangle 21">
+            <a:extLst>
+              <a:ext uri="{FF2B5EF4-FFF2-40B4-BE49-F238E27FC236}">
+                <a16:creationId xmlns:a16="http://schemas.microsoft.com/office/drawing/2014/main" id="{DBF596BC-8843-4472-8982-0499345C2ADE}"/>
+              </a:ext>
+            </a:extLst>
+          </p:cNvPr>
+          <p:cNvSpPr/>
+          <p:nvPr/>
+        </p:nvSpPr>
+        <p:spPr>
+          <a:xfrm>
+            <a:off x="7855477" y="3027393"/>
+            <a:ext cx="1628775" cy="387667"/>
+          </a:xfrm>
+          <a:prstGeom prst="rect">
+            <a:avLst/>
+          </a:prstGeom>
+          <a:solidFill>
+            <a:srgbClr val="00B050"/>
+          </a:solidFill>
+        </p:spPr>
+        <p:style>
+          <a:lnRef idx="2">
+            <a:schemeClr val="dk1">
+              <a:shade val="50000"/>
+            </a:schemeClr>
+          </a:lnRef>
+          <a:fillRef idx="1">
+            <a:schemeClr val="dk1"/>
+          </a:fillRef>
+          <a:effectRef idx="0">
+            <a:schemeClr val="dk1"/>
+          </a:effectRef>
+          <a:fontRef idx="minor">
+            <a:schemeClr val="lt1"/>
+          </a:fontRef>
+        </p:style>
+        <p:txBody>
+          <a:bodyPr rtlCol="0" anchor="ctr"/>
+          <a:lstStyle/>
+          <a:p>
+            <a:pPr algn="ctr"/>
+            <a:r>
+              <a:rPr lang="en-US" dirty="0"/>
+              <a:t>Weight</a:t>
+            </a:r>
+          </a:p>
+        </p:txBody>
+      </p:sp>
+      <p:sp>
+        <p:nvSpPr>
+          <p:cNvPr id="24" name="Rectangle 23">
+            <a:extLst>
+              <a:ext uri="{FF2B5EF4-FFF2-40B4-BE49-F238E27FC236}">
+                <a16:creationId xmlns:a16="http://schemas.microsoft.com/office/drawing/2014/main" id="{C7C0E9D0-B006-4BAF-8611-7AA13130DCC3}"/>
+              </a:ext>
+            </a:extLst>
+          </p:cNvPr>
+          <p:cNvSpPr/>
+          <p:nvPr/>
+        </p:nvSpPr>
+        <p:spPr>
+          <a:xfrm>
+            <a:off x="6065205" y="3494921"/>
+            <a:ext cx="5547347" cy="501225"/>
+          </a:xfrm>
+          <a:prstGeom prst="rect">
+            <a:avLst/>
+          </a:prstGeom>
+          <a:solidFill>
+            <a:srgbClr val="0070C0"/>
+          </a:solidFill>
+        </p:spPr>
+        <p:style>
+          <a:lnRef idx="2">
+            <a:schemeClr val="dk1">
+              <a:shade val="50000"/>
+            </a:schemeClr>
+          </a:lnRef>
+          <a:fillRef idx="1">
+            <a:schemeClr val="dk1"/>
+          </a:fillRef>
+          <a:effectRef idx="0">
+            <a:schemeClr val="dk1"/>
+          </a:effectRef>
+          <a:fontRef idx="minor">
+            <a:schemeClr val="lt1"/>
+          </a:fontRef>
+        </p:style>
+        <p:txBody>
+          <a:bodyPr rtlCol="0" anchor="ctr"/>
+          <a:lstStyle/>
+          <a:p>
+            <a:pPr algn="ctr"/>
+            <a:r>
+              <a:rPr lang="en-US" dirty="0" err="1"/>
+              <a:t>storedData</a:t>
+            </a:r>
+            <a:r>
+              <a:rPr lang="en-US" dirty="0"/>
+              <a:t> (Map)</a:t>
+            </a:r>
+          </a:p>
+        </p:txBody>
+      </p:sp>
+      <p:sp>
+        <p:nvSpPr>
+          <p:cNvPr id="28" name="Rectangle 27">
+            <a:extLst>
+              <a:ext uri="{FF2B5EF4-FFF2-40B4-BE49-F238E27FC236}">
+                <a16:creationId xmlns:a16="http://schemas.microsoft.com/office/drawing/2014/main" id="{C1DB5DF4-10F6-401E-AA8C-2ACC195491A4}"/>
+              </a:ext>
+            </a:extLst>
+          </p:cNvPr>
+          <p:cNvSpPr/>
+          <p:nvPr/>
+        </p:nvSpPr>
+        <p:spPr>
+          <a:xfrm>
+            <a:off x="6065206" y="3027394"/>
+            <a:ext cx="1628775" cy="387667"/>
+          </a:xfrm>
+          <a:prstGeom prst="rect">
+            <a:avLst/>
+          </a:prstGeom>
+          <a:solidFill>
+            <a:srgbClr val="00B050"/>
+          </a:solidFill>
+        </p:spPr>
+        <p:style>
+          <a:lnRef idx="2">
+            <a:schemeClr val="dk1">
+              <a:shade val="50000"/>
+            </a:schemeClr>
+          </a:lnRef>
+          <a:fillRef idx="1">
+            <a:schemeClr val="dk1"/>
+          </a:fillRef>
+          <a:effectRef idx="0">
+            <a:schemeClr val="dk1"/>
+          </a:effectRef>
+          <a:fontRef idx="minor">
+            <a:schemeClr val="lt1"/>
+          </a:fontRef>
+        </p:style>
+        <p:txBody>
+          <a:bodyPr rtlCol="0" anchor="ctr"/>
+          <a:lstStyle/>
+          <a:p>
+            <a:pPr algn="ctr"/>
+            <a:r>
+              <a:rPr lang="en-US" dirty="0"/>
+              <a:t>Index</a:t>
+            </a:r>
+          </a:p>
+        </p:txBody>
+      </p:sp>
+      <p:cxnSp>
+        <p:nvCxnSpPr>
+          <p:cNvPr id="10" name="Straight Arrow Connector 9">
+            <a:extLst>
+              <a:ext uri="{FF2B5EF4-FFF2-40B4-BE49-F238E27FC236}">
+                <a16:creationId xmlns:a16="http://schemas.microsoft.com/office/drawing/2014/main" id="{0B3D718A-41E3-4A68-9364-AA94967BD2C7}"/>
+              </a:ext>
+            </a:extLst>
+          </p:cNvPr>
+          <p:cNvCxnSpPr>
+            <a:cxnSpLocks/>
+          </p:cNvCxnSpPr>
+          <p:nvPr/>
+        </p:nvCxnSpPr>
+        <p:spPr>
+          <a:xfrm>
+            <a:off x="8669863" y="1425791"/>
+            <a:ext cx="0" cy="822071"/>
+          </a:xfrm>
+          <a:prstGeom prst="straightConnector1">
+            <a:avLst/>
+          </a:prstGeom>
+          <a:ln w="38100">
+            <a:tailEnd type="triangle"/>
+          </a:ln>
+        </p:spPr>
+        <p:style>
+          <a:lnRef idx="1">
+            <a:schemeClr val="accent1"/>
+          </a:lnRef>
+          <a:fillRef idx="0">
+            <a:schemeClr val="accent1"/>
+          </a:fillRef>
+          <a:effectRef idx="0">
+            <a:schemeClr val="accent1"/>
+          </a:effectRef>
+          <a:fontRef idx="minor">
+            <a:schemeClr val="tx1"/>
+          </a:fontRef>
+        </p:style>
+      </p:cxnSp>
+      <p:graphicFrame>
+        <p:nvGraphicFramePr>
+          <p:cNvPr id="34" name="Table 11">
+            <a:extLst>
+              <a:ext uri="{FF2B5EF4-FFF2-40B4-BE49-F238E27FC236}">
+                <a16:creationId xmlns:a16="http://schemas.microsoft.com/office/drawing/2014/main" id="{1BF97E07-EC42-4D66-9B50-19A2707488EB}"/>
+              </a:ext>
+            </a:extLst>
+          </p:cNvPr>
+          <p:cNvGraphicFramePr>
+            <a:graphicFrameLocks noGrp="1"/>
+          </p:cNvGraphicFramePr>
+          <p:nvPr>
+            <p:extLst>
+              <p:ext uri="{D42A27DB-BD31-4B8C-83A1-F6EECF244321}">
+                <p14:modId xmlns:p14="http://schemas.microsoft.com/office/powerpoint/2010/main" val="1381111775"/>
+              </p:ext>
+            </p:extLst>
+          </p:nvPr>
+        </p:nvGraphicFramePr>
+        <p:xfrm>
+          <a:off x="6065205" y="3991709"/>
+          <a:ext cx="5547348" cy="2339805"/>
+        </p:xfrm>
+        <a:graphic>
+          <a:graphicData uri="http://schemas.openxmlformats.org/drawingml/2006/table">
+            <a:tbl>
+              <a:tblPr firstRow="1" bandRow="1">
+                <a:tableStyleId>{5C22544A-7EE6-4342-B048-85BDC9FD1C3A}</a:tableStyleId>
+              </a:tblPr>
+              <a:tblGrid>
+                <a:gridCol w="2778953">
+                  <a:extLst>
+                    <a:ext uri="{9D8B030D-6E8A-4147-A177-3AD203B41FA5}">
+                      <a16:colId xmlns:a16="http://schemas.microsoft.com/office/drawing/2014/main" val="577567024"/>
+                    </a:ext>
+                  </a:extLst>
+                </a:gridCol>
+                <a:gridCol w="2768395">
+                  <a:extLst>
+                    <a:ext uri="{9D8B030D-6E8A-4147-A177-3AD203B41FA5}">
+                      <a16:colId xmlns:a16="http://schemas.microsoft.com/office/drawing/2014/main" val="1065119181"/>
+                    </a:ext>
+                  </a:extLst>
+                </a:gridCol>
+              </a:tblGrid>
+              <a:tr h="494566">
+                <a:tc>
+                  <a:txBody>
+                    <a:bodyPr/>
+                    <a:lstStyle/>
+                    <a:p>
+                      <a:r>
+                        <a:rPr lang="en-US" dirty="0"/>
+                        <a:t>Key </a:t>
+                      </a:r>
+                    </a:p>
+                  </a:txBody>
+                  <a:tcPr/>
+                </a:tc>
+                <a:tc>
+                  <a:txBody>
+                    <a:bodyPr/>
+                    <a:lstStyle/>
+                    <a:p>
+                      <a:r>
+                        <a:rPr lang="en-US" dirty="0"/>
+                        <a:t>Value (</a:t>
+                      </a:r>
+                      <a:r>
+                        <a:rPr lang="en-US" dirty="0" err="1"/>
+                        <a:t>DataObjPair</a:t>
+                      </a:r>
+                      <a:r>
+                        <a:rPr lang="en-US" dirty="0"/>
+                        <a:t>)</a:t>
+                      </a:r>
+                    </a:p>
+                  </a:txBody>
+                  <a:tcPr/>
+                </a:tc>
+                <a:extLst>
+                  <a:ext uri="{0D108BD9-81ED-4DB2-BD59-A6C34878D82A}">
+                    <a16:rowId xmlns:a16="http://schemas.microsoft.com/office/drawing/2014/main" val="1973540374"/>
+                  </a:ext>
+                </a:extLst>
+              </a:tr>
+              <a:tr h="1479479">
+                <a:tc>
+                  <a:txBody>
+                    <a:bodyPr/>
+                    <a:lstStyle/>
+                    <a:p>
+                      <a:r>
+                        <a:rPr lang="en-US" sz="1800" b="0" i="0" kern="1200" dirty="0">
+                          <a:solidFill>
+                            <a:schemeClr val="dk1"/>
+                          </a:solidFill>
+                          <a:effectLst/>
+                          <a:latin typeface="+mn-lt"/>
+                          <a:ea typeface="+mn-ea"/>
+                          <a:cs typeface="+mn-cs"/>
+                        </a:rPr>
+                        <a:t>h(x, r, </a:t>
+                      </a:r>
+                      <a:r>
+                        <a:rPr lang="en-US" sz="1800" b="0" i="0" kern="1200" dirty="0" err="1">
+                          <a:solidFill>
+                            <a:schemeClr val="dk1"/>
+                          </a:solidFill>
+                          <a:effectLst/>
+                          <a:latin typeface="+mn-lt"/>
+                          <a:ea typeface="+mn-ea"/>
+                          <a:cs typeface="+mn-cs"/>
+                        </a:rPr>
+                        <a:t>cid</a:t>
+                      </a:r>
+                      <a:r>
+                        <a:rPr lang="en-US" sz="1800" b="0" i="0" kern="1200" dirty="0">
+                          <a:solidFill>
+                            <a:schemeClr val="dk1"/>
+                          </a:solidFill>
+                          <a:effectLst/>
+                          <a:latin typeface="+mn-lt"/>
+                          <a:ea typeface="+mn-ea"/>
+                          <a:cs typeface="+mn-cs"/>
+                        </a:rPr>
+                        <a:t>)</a:t>
+                      </a:r>
+                    </a:p>
+                    <a:p>
+                      <a:r>
+                        <a:rPr lang="en-US" sz="1800" b="0" i="0" kern="1200" dirty="0">
+                          <a:solidFill>
+                            <a:schemeClr val="dk1"/>
+                          </a:solidFill>
+                          <a:effectLst/>
+                          <a:latin typeface="+mn-lt"/>
+                          <a:ea typeface="+mn-ea"/>
+                          <a:cs typeface="+mn-cs"/>
+                        </a:rPr>
+                        <a:t>h(111, 0, 1)</a:t>
+                      </a:r>
+                      <a:endParaRPr lang="en-US" dirty="0"/>
+                    </a:p>
+                  </a:txBody>
+                  <a:tcPr/>
+                </a:tc>
+                <a:tc>
+                  <a:txBody>
+                    <a:bodyPr/>
+                    <a:lstStyle/>
+                    <a:p>
+                      <a:endParaRPr lang="en-US" dirty="0"/>
+                    </a:p>
+                  </a:txBody>
+                  <a:tcPr/>
+                </a:tc>
+                <a:extLst>
+                  <a:ext uri="{0D108BD9-81ED-4DB2-BD59-A6C34878D82A}">
+                    <a16:rowId xmlns:a16="http://schemas.microsoft.com/office/drawing/2014/main" val="83294924"/>
+                  </a:ext>
+                </a:extLst>
+              </a:tr>
+              <a:tr h="205483">
+                <a:tc>
+                  <a:txBody>
+                    <a:bodyPr/>
+                    <a:lstStyle/>
+                    <a:p>
+                      <a:r>
+                        <a:rPr lang="en-US" dirty="0"/>
+                        <a:t>…</a:t>
+                      </a:r>
+                    </a:p>
+                  </a:txBody>
+                  <a:tcPr/>
+                </a:tc>
+                <a:tc>
+                  <a:txBody>
+                    <a:bodyPr/>
+                    <a:lstStyle/>
+                    <a:p>
+                      <a:r>
+                        <a:rPr lang="en-US" dirty="0"/>
+                        <a:t>…</a:t>
+                      </a:r>
+                    </a:p>
+                  </a:txBody>
+                  <a:tcPr/>
+                </a:tc>
+                <a:extLst>
+                  <a:ext uri="{0D108BD9-81ED-4DB2-BD59-A6C34878D82A}">
+                    <a16:rowId xmlns:a16="http://schemas.microsoft.com/office/drawing/2014/main" val="2428146266"/>
+                  </a:ext>
+                </a:extLst>
+              </a:tr>
+            </a:tbl>
+          </a:graphicData>
+        </a:graphic>
+      </p:graphicFrame>
+      <p:graphicFrame>
+        <p:nvGraphicFramePr>
+          <p:cNvPr id="37" name="Table 37">
+            <a:extLst>
+              <a:ext uri="{FF2B5EF4-FFF2-40B4-BE49-F238E27FC236}">
+                <a16:creationId xmlns:a16="http://schemas.microsoft.com/office/drawing/2014/main" id="{62FB0A13-FB28-4B4F-B553-7EFA1F6BE84E}"/>
+              </a:ext>
+            </a:extLst>
+          </p:cNvPr>
+          <p:cNvGraphicFramePr>
+            <a:graphicFrameLocks noGrp="1"/>
+          </p:cNvGraphicFramePr>
+          <p:nvPr>
+            <p:extLst>
+              <p:ext uri="{D42A27DB-BD31-4B8C-83A1-F6EECF244321}">
+                <p14:modId xmlns:p14="http://schemas.microsoft.com/office/powerpoint/2010/main" val="1042610755"/>
+              </p:ext>
+            </p:extLst>
+          </p:nvPr>
+        </p:nvGraphicFramePr>
+        <p:xfrm>
+          <a:off x="8922699" y="5054241"/>
+          <a:ext cx="2353720" cy="731520"/>
+        </p:xfrm>
+        <a:graphic>
+          <a:graphicData uri="http://schemas.openxmlformats.org/drawingml/2006/table">
+            <a:tbl>
+              <a:tblPr firstRow="1" bandRow="1">
+                <a:tableStyleId>{93296810-A885-4BE3-A3E7-6D5BEEA58F35}</a:tableStyleId>
+              </a:tblPr>
+              <a:tblGrid>
+                <a:gridCol w="1176860">
+                  <a:extLst>
+                    <a:ext uri="{9D8B030D-6E8A-4147-A177-3AD203B41FA5}">
+                      <a16:colId xmlns:a16="http://schemas.microsoft.com/office/drawing/2014/main" val="670843977"/>
+                    </a:ext>
+                  </a:extLst>
+                </a:gridCol>
+                <a:gridCol w="1176860">
+                  <a:extLst>
+                    <a:ext uri="{9D8B030D-6E8A-4147-A177-3AD203B41FA5}">
+                      <a16:colId xmlns:a16="http://schemas.microsoft.com/office/drawing/2014/main" val="233749276"/>
+                    </a:ext>
+                  </a:extLst>
+                </a:gridCol>
+              </a:tblGrid>
+              <a:tr h="305030">
+                <a:tc>
+                  <a:txBody>
+                    <a:bodyPr/>
+                    <a:lstStyle/>
+                    <a:p>
+                      <a:r>
+                        <a:rPr lang="en-US" dirty="0"/>
+                        <a:t>Key</a:t>
+                      </a:r>
+                    </a:p>
+                  </a:txBody>
+                  <a:tcPr/>
+                </a:tc>
+                <a:tc>
+                  <a:txBody>
+                    <a:bodyPr/>
+                    <a:lstStyle/>
+                    <a:p>
+                      <a:r>
+                        <a:rPr lang="en-US" dirty="0"/>
+                        <a:t>Value</a:t>
+                      </a:r>
+                    </a:p>
+                  </a:txBody>
+                  <a:tcPr/>
+                </a:tc>
+                <a:extLst>
+                  <a:ext uri="{0D108BD9-81ED-4DB2-BD59-A6C34878D82A}">
+                    <a16:rowId xmlns:a16="http://schemas.microsoft.com/office/drawing/2014/main" val="2209629504"/>
+                  </a:ext>
+                </a:extLst>
+              </a:tr>
+              <a:tr h="305030">
+                <a:tc>
+                  <a:txBody>
+                    <a:bodyPr/>
+                    <a:lstStyle/>
+                    <a:p>
+                      <a:r>
+                        <a:rPr lang="en-US" dirty="0"/>
+                        <a:t>111</a:t>
+                      </a:r>
+                    </a:p>
+                  </a:txBody>
+                  <a:tcPr/>
+                </a:tc>
+                <a:tc>
+                  <a:txBody>
+                    <a:bodyPr/>
+                    <a:lstStyle/>
+                    <a:p>
+                      <a:r>
+                        <a:rPr lang="en-US" dirty="0"/>
+                        <a:t>“data A”</a:t>
+                      </a:r>
+                    </a:p>
+                  </a:txBody>
+                  <a:tcPr/>
+                </a:tc>
+                <a:extLst>
+                  <a:ext uri="{0D108BD9-81ED-4DB2-BD59-A6C34878D82A}">
+                    <a16:rowId xmlns:a16="http://schemas.microsoft.com/office/drawing/2014/main" val="145509688"/>
+                  </a:ext>
+                </a:extLst>
+              </a:tr>
+            </a:tbl>
+          </a:graphicData>
+        </a:graphic>
+      </p:graphicFrame>
+      <p:sp>
+        <p:nvSpPr>
+          <p:cNvPr id="38" name="Rectangle 37">
+            <a:extLst>
+              <a:ext uri="{FF2B5EF4-FFF2-40B4-BE49-F238E27FC236}">
+                <a16:creationId xmlns:a16="http://schemas.microsoft.com/office/drawing/2014/main" id="{B36EA7AB-73C4-4FE7-AA7D-7AAE49B8EE77}"/>
+              </a:ext>
+            </a:extLst>
+          </p:cNvPr>
+          <p:cNvSpPr/>
+          <p:nvPr/>
+        </p:nvSpPr>
+        <p:spPr>
+          <a:xfrm>
+            <a:off x="8978336" y="4521312"/>
+            <a:ext cx="1313006" cy="387667"/>
+          </a:xfrm>
+          <a:prstGeom prst="rect">
+            <a:avLst/>
+          </a:prstGeom>
+          <a:solidFill>
+            <a:srgbClr val="00B050"/>
+          </a:solidFill>
+        </p:spPr>
+        <p:style>
+          <a:lnRef idx="2">
+            <a:schemeClr val="dk1">
+              <a:shade val="50000"/>
+            </a:schemeClr>
+          </a:lnRef>
+          <a:fillRef idx="1">
+            <a:schemeClr val="dk1"/>
+          </a:fillRef>
+          <a:effectRef idx="0">
+            <a:schemeClr val="dk1"/>
+          </a:effectRef>
+          <a:fontRef idx="minor">
+            <a:schemeClr val="lt1"/>
+          </a:fontRef>
+        </p:style>
+        <p:txBody>
+          <a:bodyPr rtlCol="0" anchor="ctr"/>
+          <a:lstStyle/>
+          <a:p>
+            <a:pPr algn="ctr"/>
+            <a:r>
+              <a:rPr lang="en-US" dirty="0"/>
+              <a:t>Replica Id</a:t>
+            </a:r>
+          </a:p>
+        </p:txBody>
+      </p:sp>
+    </p:spTree>
+    <p:extLst>
+      <p:ext uri="{BB962C8B-B14F-4D97-AF65-F5344CB8AC3E}">
+        <p14:creationId xmlns:p14="http://schemas.microsoft.com/office/powerpoint/2010/main" val="3522375169"/>
+      </p:ext>
+    </p:extLst>
+  </p:cSld>
+  <p:clrMapOvr>
+    <a:masterClrMapping/>
+  </p:clrMapOvr>
+</p:sld>
+</file>
+
 <file path=ppt/theme/theme1.xml><?xml version="1.0" encoding="utf-8"?>
 <a:theme xmlns:a="http://schemas.openxmlformats.org/drawingml/2006/main" name="Office Theme">
   <a:themeElements>
@@ -5439,4 +6942,299 @@
     </a:ext>
   </a:extLst>
 </a:theme>
+</file>
+
+<file path=ppt/theme/theme2.xml><?xml version="1.0" encoding="utf-8"?>
+<a:theme xmlns:a="http://schemas.openxmlformats.org/drawingml/2006/main" name="Office Theme">
+  <a:themeElements>
+    <a:clrScheme name="Office">
+      <a:dk1>
+        <a:sysClr val="windowText" lastClr="000000"/>
+      </a:dk1>
+      <a:lt1>
+        <a:sysClr val="window" lastClr="FFFFFF"/>
+      </a:lt1>
+      <a:dk2>
+        <a:srgbClr val="44546A"/>
+      </a:dk2>
+      <a:lt2>
+        <a:srgbClr val="E7E6E6"/>
+      </a:lt2>
+      <a:accent1>
+        <a:srgbClr val="4472C4"/>
+      </a:accent1>
+      <a:accent2>
+        <a:srgbClr val="ED7D31"/>
+      </a:accent2>
+      <a:accent3>
+        <a:srgbClr val="A5A5A5"/>
+      </a:accent3>
+      <a:accent4>
+        <a:srgbClr val="FFC000"/>
+      </a:accent4>
+      <a:accent5>
+        <a:srgbClr val="5B9BD5"/>
+      </a:accent5>
+      <a:accent6>
+        <a:srgbClr val="70AD47"/>
+      </a:accent6>
+      <a:hlink>
+        <a:srgbClr val="0563C1"/>
+      </a:hlink>
+      <a:folHlink>
+        <a:srgbClr val="954F72"/>
+      </a:folHlink>
+    </a:clrScheme>
+    <a:fontScheme name="Office">
+      <a:majorFont>
+        <a:latin typeface="Calibri Light" panose="020F0302020204030204"/>
+        <a:ea typeface=""/>
+        <a:cs typeface=""/>
+        <a:font script="Jpan" typeface="游ゴシック Light"/>
+        <a:font script="Hang" typeface="맑은 고딕"/>
+        <a:font script="Hans" typeface="等线 Light"/>
+        <a:font script="Hant" typeface="新細明體"/>
+        <a:font script="Arab" typeface="Times New Roman"/>
+        <a:font script="Hebr" typeface="Times New Roman"/>
+        <a:font script="Thai" typeface="Angsana New"/>
+        <a:font script="Ethi" typeface="Nyala"/>
+        <a:font script="Beng" typeface="Vrinda"/>
+        <a:font script="Gujr" typeface="Shruti"/>
+        <a:font script="Khmr" typeface="MoolBoran"/>
+        <a:font script="Knda" typeface="Tunga"/>
+        <a:font script="Guru" typeface="Raavi"/>
+        <a:font script="Cans" typeface="Euphemia"/>
+        <a:font script="Cher" typeface="Plantagenet Cherokee"/>
+        <a:font script="Yiii" typeface="Microsoft Yi Baiti"/>
+        <a:font script="Tibt" typeface="Microsoft Himalaya"/>
+        <a:font script="Thaa" typeface="MV Boli"/>
+        <a:font script="Deva" typeface="Mangal"/>
+        <a:font script="Telu" typeface="Gautami"/>
+        <a:font script="Taml" typeface="Latha"/>
+        <a:font script="Syrc" typeface="Estrangelo Edessa"/>
+        <a:font script="Orya" typeface="Kalinga"/>
+        <a:font script="Mlym" typeface="Kartika"/>
+        <a:font script="Laoo" typeface="DokChampa"/>
+        <a:font script="Sinh" typeface="Iskoola Pota"/>
+        <a:font script="Mong" typeface="Mongolian Baiti"/>
+        <a:font script="Viet" typeface="Times New Roman"/>
+        <a:font script="Uigh" typeface="Microsoft Uighur"/>
+        <a:font script="Geor" typeface="Sylfaen"/>
+        <a:font script="Armn" typeface="Arial"/>
+        <a:font script="Bugi" typeface="Leelawadee UI"/>
+        <a:font script="Bopo" typeface="Microsoft JhengHei"/>
+        <a:font script="Java" typeface="Javanese Text"/>
+        <a:font script="Lisu" typeface="Segoe UI"/>
+        <a:font script="Mymr" typeface="Myanmar Text"/>
+        <a:font script="Nkoo" typeface="Ebrima"/>
+        <a:font script="Olck" typeface="Nirmala UI"/>
+        <a:font script="Osma" typeface="Ebrima"/>
+        <a:font script="Phag" typeface="Phagspa"/>
+        <a:font script="Syrn" typeface="Estrangelo Edessa"/>
+        <a:font script="Syrj" typeface="Estrangelo Edessa"/>
+        <a:font script="Syre" typeface="Estrangelo Edessa"/>
+        <a:font script="Sora" typeface="Nirmala UI"/>
+        <a:font script="Tale" typeface="Microsoft Tai Le"/>
+        <a:font script="Talu" typeface="Microsoft New Tai Lue"/>
+        <a:font script="Tfng" typeface="Ebrima"/>
+      </a:majorFont>
+      <a:minorFont>
+        <a:latin typeface="Calibri" panose="020F0502020204030204"/>
+        <a:ea typeface=""/>
+        <a:cs typeface=""/>
+        <a:font script="Jpan" typeface="游ゴシック"/>
+        <a:font script="Hang" typeface="맑은 고딕"/>
+        <a:font script="Hans" typeface="等线"/>
+        <a:font script="Hant" typeface="新細明體"/>
+        <a:font script="Arab" typeface="Arial"/>
+        <a:font script="Hebr" typeface="Arial"/>
+        <a:font script="Thai" typeface="Cordia New"/>
+        <a:font script="Ethi" typeface="Nyala"/>
+        <a:font script="Beng" typeface="Vrinda"/>
+        <a:font script="Gujr" typeface="Shruti"/>
+        <a:font script="Khmr" typeface="DaunPenh"/>
+        <a:font script="Knda" typeface="Tunga"/>
+        <a:font script="Guru" typeface="Raavi"/>
+        <a:font script="Cans" typeface="Euphemia"/>
+        <a:font script="Cher" typeface="Plantagenet Cherokee"/>
+        <a:font script="Yiii" typeface="Microsoft Yi Baiti"/>
+        <a:font script="Tibt" typeface="Microsoft Himalaya"/>
+        <a:font script="Thaa" typeface="MV Boli"/>
+        <a:font script="Deva" typeface="Mangal"/>
+        <a:font script="Telu" typeface="Gautami"/>
+        <a:font script="Taml" typeface="Latha"/>
+        <a:font script="Syrc" typeface="Estrangelo Edessa"/>
+        <a:font script="Orya" typeface="Kalinga"/>
+        <a:font script="Mlym" typeface="Kartika"/>
+        <a:font script="Laoo" typeface="DokChampa"/>
+        <a:font script="Sinh" typeface="Iskoola Pota"/>
+        <a:font script="Mong" typeface="Mongolian Baiti"/>
+        <a:font script="Viet" typeface="Arial"/>
+        <a:font script="Uigh" typeface="Microsoft Uighur"/>
+        <a:font script="Geor" typeface="Sylfaen"/>
+        <a:font script="Armn" typeface="Arial"/>
+        <a:font script="Bugi" typeface="Leelawadee UI"/>
+        <a:font script="Bopo" typeface="Microsoft JhengHei"/>
+        <a:font script="Java" typeface="Javanese Text"/>
+        <a:font script="Lisu" typeface="Segoe UI"/>
+        <a:font script="Mymr" typeface="Myanmar Text"/>
+        <a:font script="Nkoo" typeface="Ebrima"/>
+        <a:font script="Olck" typeface="Nirmala UI"/>
+        <a:font script="Osma" typeface="Ebrima"/>
+        <a:font script="Phag" typeface="Phagspa"/>
+        <a:font script="Syrn" typeface="Estrangelo Edessa"/>
+        <a:font script="Syrj" typeface="Estrangelo Edessa"/>
+        <a:font script="Syre" typeface="Estrangelo Edessa"/>
+        <a:font script="Sora" typeface="Nirmala UI"/>
+        <a:font script="Tale" typeface="Microsoft Tai Le"/>
+        <a:font script="Talu" typeface="Microsoft New Tai Lue"/>
+        <a:font script="Tfng" typeface="Ebrima"/>
+      </a:minorFont>
+    </a:fontScheme>
+    <a:fmtScheme name="Office">
+      <a:fillStyleLst>
+        <a:solidFill>
+          <a:schemeClr val="phClr"/>
+        </a:solidFill>
+        <a:gradFill rotWithShape="1">
+          <a:gsLst>
+            <a:gs pos="0">
+              <a:schemeClr val="phClr">
+                <a:lumMod val="110000"/>
+                <a:satMod val="105000"/>
+                <a:tint val="67000"/>
+              </a:schemeClr>
+            </a:gs>
+            <a:gs pos="50000">
+              <a:schemeClr val="phClr">
+                <a:lumMod val="105000"/>
+                <a:satMod val="103000"/>
+                <a:tint val="73000"/>
+              </a:schemeClr>
+            </a:gs>
+            <a:gs pos="100000">
+              <a:schemeClr val="phClr">
+                <a:lumMod val="105000"/>
+                <a:satMod val="109000"/>
+                <a:tint val="81000"/>
+              </a:schemeClr>
+            </a:gs>
+          </a:gsLst>
+          <a:lin ang="5400000" scaled="0"/>
+        </a:gradFill>
+        <a:gradFill rotWithShape="1">
+          <a:gsLst>
+            <a:gs pos="0">
+              <a:schemeClr val="phClr">
+                <a:satMod val="103000"/>
+                <a:lumMod val="102000"/>
+                <a:tint val="94000"/>
+              </a:schemeClr>
+            </a:gs>
+            <a:gs pos="50000">
+              <a:schemeClr val="phClr">
+                <a:satMod val="110000"/>
+                <a:lumMod val="100000"/>
+                <a:shade val="100000"/>
+              </a:schemeClr>
+            </a:gs>
+            <a:gs pos="100000">
+              <a:schemeClr val="phClr">
+                <a:lumMod val="99000"/>
+                <a:satMod val="120000"/>
+                <a:shade val="78000"/>
+              </a:schemeClr>
+            </a:gs>
+          </a:gsLst>
+          <a:lin ang="5400000" scaled="0"/>
+        </a:gradFill>
+      </a:fillStyleLst>
+      <a:lnStyleLst>
+        <a:ln w="6350" cap="flat" cmpd="sng" algn="ctr">
+          <a:solidFill>
+            <a:schemeClr val="phClr"/>
+          </a:solidFill>
+          <a:prstDash val="solid"/>
+          <a:miter lim="800000"/>
+        </a:ln>
+        <a:ln w="12700" cap="flat" cmpd="sng" algn="ctr">
+          <a:solidFill>
+            <a:schemeClr val="phClr"/>
+          </a:solidFill>
+          <a:prstDash val="solid"/>
+          <a:miter lim="800000"/>
+        </a:ln>
+        <a:ln w="19050" cap="flat" cmpd="sng" algn="ctr">
+          <a:solidFill>
+            <a:schemeClr val="phClr"/>
+          </a:solidFill>
+          <a:prstDash val="solid"/>
+          <a:miter lim="800000"/>
+        </a:ln>
+      </a:lnStyleLst>
+      <a:effectStyleLst>
+        <a:effectStyle>
+          <a:effectLst/>
+        </a:effectStyle>
+        <a:effectStyle>
+          <a:effectLst/>
+        </a:effectStyle>
+        <a:effectStyle>
+          <a:effectLst>
+            <a:outerShdw blurRad="57150" dist="19050" dir="5400000" algn="ctr" rotWithShape="0">
+              <a:srgbClr val="000000">
+                <a:alpha val="63000"/>
+              </a:srgbClr>
+            </a:outerShdw>
+          </a:effectLst>
+        </a:effectStyle>
+      </a:effectStyleLst>
+      <a:bgFillStyleLst>
+        <a:solidFill>
+          <a:schemeClr val="phClr"/>
+        </a:solidFill>
+        <a:solidFill>
+          <a:schemeClr val="phClr">
+            <a:tint val="95000"/>
+            <a:satMod val="170000"/>
+          </a:schemeClr>
+        </a:solidFill>
+        <a:gradFill rotWithShape="1">
+          <a:gsLst>
+            <a:gs pos="0">
+              <a:schemeClr val="phClr">
+                <a:tint val="93000"/>
+                <a:satMod val="150000"/>
+                <a:shade val="98000"/>
+                <a:lumMod val="102000"/>
+              </a:schemeClr>
+            </a:gs>
+            <a:gs pos="50000">
+              <a:schemeClr val="phClr">
+                <a:tint val="98000"/>
+                <a:satMod val="130000"/>
+                <a:shade val="90000"/>
+                <a:lumMod val="103000"/>
+              </a:schemeClr>
+            </a:gs>
+            <a:gs pos="100000">
+              <a:schemeClr val="phClr">
+                <a:shade val="63000"/>
+                <a:satMod val="120000"/>
+              </a:schemeClr>
+            </a:gs>
+          </a:gsLst>
+          <a:lin ang="5400000" scaled="0"/>
+        </a:gradFill>
+      </a:bgFillStyleLst>
+    </a:fmtScheme>
+  </a:themeElements>
+  <a:objectDefaults/>
+  <a:extraClrSchemeLst/>
+  <a:extLst>
+    <a:ext uri="{05A4C25C-085E-4340-85A3-A5531E510DB2}">
+      <thm15:themeFamily xmlns:thm15="http://schemas.microsoft.com/office/thememl/2012/main" name="Office Theme" id="{62F939B6-93AF-4DB8-9C6B-D6C7DFDC589F}" vid="{4A3C46E8-61CC-4603-A589-7422A47A8E4A}"/>
+    </a:ext>
+  </a:extLst>
+</a:theme>
 </file>
</xml_diff>